<commit_message>
reran all scripts after ml outlier id
</commit_message>
<xml_diff>
--- a/figures/figures.pptx
+++ b/figures/figures.pptx
@@ -213,7 +213,7 @@
           <a:p>
             <a:fld id="{A84C03E3-B0BF-5C40-B9EC-4B39A4AA5E1B}" type="datetimeFigureOut">
               <a:rPr lang="en-US" smtClean="0"/>
-              <a:t>10/14/20</a:t>
+              <a:t>10/28/20</a:t>
             </a:fld>
             <a:endParaRPr lang="en-US"/>
           </a:p>
@@ -1067,7 +1067,7 @@
           <a:p>
             <a:fld id="{828A800D-FD12-1143-85AB-6998B637A4E2}" type="datetimeFigureOut">
               <a:rPr lang="en-US" smtClean="0"/>
-              <a:t>10/14/20</a:t>
+              <a:t>10/28/20</a:t>
             </a:fld>
             <a:endParaRPr lang="en-US"/>
           </a:p>
@@ -1265,7 +1265,7 @@
           <a:p>
             <a:fld id="{828A800D-FD12-1143-85AB-6998B637A4E2}" type="datetimeFigureOut">
               <a:rPr lang="en-US" smtClean="0"/>
-              <a:t>10/14/20</a:t>
+              <a:t>10/28/20</a:t>
             </a:fld>
             <a:endParaRPr lang="en-US"/>
           </a:p>
@@ -1473,7 +1473,7 @@
           <a:p>
             <a:fld id="{828A800D-FD12-1143-85AB-6998B637A4E2}" type="datetimeFigureOut">
               <a:rPr lang="en-US" smtClean="0"/>
-              <a:t>10/14/20</a:t>
+              <a:t>10/28/20</a:t>
             </a:fld>
             <a:endParaRPr lang="en-US"/>
           </a:p>
@@ -1961,7 +1961,7 @@
           <a:p>
             <a:fld id="{828A800D-FD12-1143-85AB-6998B637A4E2}" type="datetimeFigureOut">
               <a:rPr lang="en-US" smtClean="0"/>
-              <a:t>10/14/20</a:t>
+              <a:t>10/28/20</a:t>
             </a:fld>
             <a:endParaRPr lang="en-US"/>
           </a:p>
@@ -2236,7 +2236,7 @@
           <a:p>
             <a:fld id="{828A800D-FD12-1143-85AB-6998B637A4E2}" type="datetimeFigureOut">
               <a:rPr lang="en-US" smtClean="0"/>
-              <a:t>10/14/20</a:t>
+              <a:t>10/28/20</a:t>
             </a:fld>
             <a:endParaRPr lang="en-US"/>
           </a:p>
@@ -2501,7 +2501,7 @@
           <a:p>
             <a:fld id="{828A800D-FD12-1143-85AB-6998B637A4E2}" type="datetimeFigureOut">
               <a:rPr lang="en-US" smtClean="0"/>
-              <a:t>10/14/20</a:t>
+              <a:t>10/28/20</a:t>
             </a:fld>
             <a:endParaRPr lang="en-US"/>
           </a:p>
@@ -2913,7 +2913,7 @@
           <a:p>
             <a:fld id="{828A800D-FD12-1143-85AB-6998B637A4E2}" type="datetimeFigureOut">
               <a:rPr lang="en-US" smtClean="0"/>
-              <a:t>10/14/20</a:t>
+              <a:t>10/28/20</a:t>
             </a:fld>
             <a:endParaRPr lang="en-US"/>
           </a:p>
@@ -3054,7 +3054,7 @@
           <a:p>
             <a:fld id="{828A800D-FD12-1143-85AB-6998B637A4E2}" type="datetimeFigureOut">
               <a:rPr lang="en-US" smtClean="0"/>
-              <a:t>10/14/20</a:t>
+              <a:t>10/28/20</a:t>
             </a:fld>
             <a:endParaRPr lang="en-US"/>
           </a:p>
@@ -3167,7 +3167,7 @@
           <a:p>
             <a:fld id="{828A800D-FD12-1143-85AB-6998B637A4E2}" type="datetimeFigureOut">
               <a:rPr lang="en-US" smtClean="0"/>
-              <a:t>10/14/20</a:t>
+              <a:t>10/28/20</a:t>
             </a:fld>
             <a:endParaRPr lang="en-US"/>
           </a:p>
@@ -3478,7 +3478,7 @@
           <a:p>
             <a:fld id="{828A800D-FD12-1143-85AB-6998B637A4E2}" type="datetimeFigureOut">
               <a:rPr lang="en-US" smtClean="0"/>
-              <a:t>10/14/20</a:t>
+              <a:t>10/28/20</a:t>
             </a:fld>
             <a:endParaRPr lang="en-US"/>
           </a:p>
@@ -3766,7 +3766,7 @@
           <a:p>
             <a:fld id="{828A800D-FD12-1143-85AB-6998B637A4E2}" type="datetimeFigureOut">
               <a:rPr lang="en-US" smtClean="0"/>
-              <a:t>10/14/20</a:t>
+              <a:t>10/28/20</a:t>
             </a:fld>
             <a:endParaRPr lang="en-US"/>
           </a:p>
@@ -4007,7 +4007,7 @@
           <a:p>
             <a:fld id="{828A800D-FD12-1143-85AB-6998B637A4E2}" type="datetimeFigureOut">
               <a:rPr lang="en-US" smtClean="0"/>
-              <a:t>10/14/20</a:t>
+              <a:t>10/28/20</a:t>
             </a:fld>
             <a:endParaRPr lang="en-US"/>
           </a:p>
@@ -9517,10 +9517,10 @@
       </p:sp>
       <p:pic>
         <p:nvPicPr>
-          <p:cNvPr id="12" name="Picture 11">
-            <a:extLst>
-              <a:ext uri="{FF2B5EF4-FFF2-40B4-BE49-F238E27FC236}">
-                <a16:creationId xmlns:a16="http://schemas.microsoft.com/office/drawing/2014/main" id="{470D063C-1E4F-324E-A9E9-FCF3A832AAEB}"/>
+          <p:cNvPr id="20" name="Picture 19">
+            <a:extLst>
+              <a:ext uri="{FF2B5EF4-FFF2-40B4-BE49-F238E27FC236}">
+                <a16:creationId xmlns:a16="http://schemas.microsoft.com/office/drawing/2014/main" id="{2F76CAEB-2BC7-5D43-B600-84A52A37BDEA}"/>
               </a:ext>
             </a:extLst>
           </p:cNvPr>
@@ -9531,35 +9531,6 @@
         </p:nvPicPr>
         <p:blipFill rotWithShape="1">
           <a:blip r:embed="rId6"/>
-          <a:srcRect l="13956" t="21377" r="23014" b="16049"/>
-          <a:stretch/>
-        </p:blipFill>
-        <p:spPr>
-          <a:xfrm>
-            <a:off x="8763120" y="4391051"/>
-            <a:ext cx="1374997" cy="1365049"/>
-          </a:xfrm>
-          <a:prstGeom prst="rect">
-            <a:avLst/>
-          </a:prstGeom>
-        </p:spPr>
-      </p:pic>
-      <p:pic>
-        <p:nvPicPr>
-          <p:cNvPr id="20" name="Picture 19">
-            <a:extLst>
-              <a:ext uri="{FF2B5EF4-FFF2-40B4-BE49-F238E27FC236}">
-                <a16:creationId xmlns:a16="http://schemas.microsoft.com/office/drawing/2014/main" id="{2F76CAEB-2BC7-5D43-B600-84A52A37BDEA}"/>
-              </a:ext>
-            </a:extLst>
-          </p:cNvPr>
-          <p:cNvPicPr>
-            <a:picLocks noChangeAspect="1"/>
-          </p:cNvPicPr>
-          <p:nvPr/>
-        </p:nvPicPr>
-        <p:blipFill rotWithShape="1">
-          <a:blip r:embed="rId7"/>
           <a:srcRect l="13405" t="20109" r="23844" b="16050"/>
           <a:stretch/>
         </p:blipFill>
@@ -9588,7 +9559,7 @@
           <p:nvPr/>
         </p:nvPicPr>
         <p:blipFill rotWithShape="1">
-          <a:blip r:embed="rId8"/>
+          <a:blip r:embed="rId7"/>
           <a:srcRect l="76032" t="20675" r="1294" b="51897"/>
           <a:stretch/>
         </p:blipFill>
@@ -9604,10 +9575,40 @@
       </p:pic>
       <p:pic>
         <p:nvPicPr>
-          <p:cNvPr id="4" name="Picture 3">
-            <a:extLst>
-              <a:ext uri="{FF2B5EF4-FFF2-40B4-BE49-F238E27FC236}">
-                <a16:creationId xmlns:a16="http://schemas.microsoft.com/office/drawing/2014/main" id="{26A4AF84-50C1-2045-ADE0-16D472C77118}"/>
+          <p:cNvPr id="5" name="Picture 4">
+            <a:extLst>
+              <a:ext uri="{FF2B5EF4-FFF2-40B4-BE49-F238E27FC236}">
+                <a16:creationId xmlns:a16="http://schemas.microsoft.com/office/drawing/2014/main" id="{657F9D8B-8896-4044-A776-E74ED2A7D6FD}"/>
+              </a:ext>
+            </a:extLst>
+          </p:cNvPr>
+          <p:cNvPicPr>
+            <a:picLocks noChangeAspect="1"/>
+          </p:cNvPicPr>
+          <p:nvPr/>
+        </p:nvPicPr>
+        <p:blipFill>
+          <a:blip r:embed="rId8"/>
+          <a:stretch>
+            <a:fillRect/>
+          </a:stretch>
+        </p:blipFill>
+        <p:spPr>
+          <a:xfrm>
+            <a:off x="10362763" y="3904157"/>
+            <a:ext cx="1374997" cy="1348984"/>
+          </a:xfrm>
+          <a:prstGeom prst="rect">
+            <a:avLst/>
+          </a:prstGeom>
+        </p:spPr>
+      </p:pic>
+      <p:pic>
+        <p:nvPicPr>
+          <p:cNvPr id="7" name="Picture 6">
+            <a:extLst>
+              <a:ext uri="{FF2B5EF4-FFF2-40B4-BE49-F238E27FC236}">
+                <a16:creationId xmlns:a16="http://schemas.microsoft.com/office/drawing/2014/main" id="{BC75240D-2E85-2C48-BF33-15246D7134C4}"/>
               </a:ext>
             </a:extLst>
           </p:cNvPr>
@@ -9624,8 +9625,8 @@
         </p:blipFill>
         <p:spPr>
           <a:xfrm>
-            <a:off x="9836917" y="1891427"/>
-            <a:ext cx="1550275" cy="1452620"/>
+            <a:off x="9879311" y="1863194"/>
+            <a:ext cx="1499846" cy="1524983"/>
           </a:xfrm>
           <a:prstGeom prst="rect">
             <a:avLst/>
@@ -9634,10 +9635,10 @@
       </p:pic>
       <p:pic>
         <p:nvPicPr>
-          <p:cNvPr id="5" name="Picture 4">
-            <a:extLst>
-              <a:ext uri="{FF2B5EF4-FFF2-40B4-BE49-F238E27FC236}">
-                <a16:creationId xmlns:a16="http://schemas.microsoft.com/office/drawing/2014/main" id="{657F9D8B-8896-4044-A776-E74ED2A7D6FD}"/>
+          <p:cNvPr id="9" name="Picture 8">
+            <a:extLst>
+              <a:ext uri="{FF2B5EF4-FFF2-40B4-BE49-F238E27FC236}">
+                <a16:creationId xmlns:a16="http://schemas.microsoft.com/office/drawing/2014/main" id="{84E51B76-02E3-CF42-9584-CE7FF505CFDC}"/>
               </a:ext>
             </a:extLst>
           </p:cNvPr>
@@ -9654,8 +9655,8 @@
         </p:blipFill>
         <p:spPr>
           <a:xfrm>
-            <a:off x="10362763" y="3904157"/>
-            <a:ext cx="1374997" cy="1348984"/>
+            <a:off x="8700139" y="4370480"/>
+            <a:ext cx="1410058" cy="1368024"/>
           </a:xfrm>
           <a:prstGeom prst="rect">
             <a:avLst/>

</xml_diff>

<commit_message>
updated fig 4 processing, and QA edits
</commit_message>
<xml_diff>
--- a/figures/figures.pptx
+++ b/figures/figures.pptx
@@ -9517,10 +9517,10 @@
       </p:sp>
       <p:pic>
         <p:nvPicPr>
-          <p:cNvPr id="20" name="Picture 19">
-            <a:extLst>
-              <a:ext uri="{FF2B5EF4-FFF2-40B4-BE49-F238E27FC236}">
-                <a16:creationId xmlns:a16="http://schemas.microsoft.com/office/drawing/2014/main" id="{2F76CAEB-2BC7-5D43-B600-84A52A37BDEA}"/>
+          <p:cNvPr id="138" name="Picture 137">
+            <a:extLst>
+              <a:ext uri="{FF2B5EF4-FFF2-40B4-BE49-F238E27FC236}">
+                <a16:creationId xmlns:a16="http://schemas.microsoft.com/office/drawing/2014/main" id="{E629F1C3-EFAB-A843-8339-C9295D13D5EA}"/>
               </a:ext>
             </a:extLst>
           </p:cNvPr>
@@ -9531,35 +9531,6 @@
         </p:nvPicPr>
         <p:blipFill rotWithShape="1">
           <a:blip r:embed="rId6"/>
-          <a:srcRect l="13405" t="20109" r="23844" b="16050"/>
-          <a:stretch/>
-        </p:blipFill>
-        <p:spPr>
-          <a:xfrm>
-            <a:off x="7843256" y="2086950"/>
-            <a:ext cx="1713767" cy="1743597"/>
-          </a:xfrm>
-          <a:prstGeom prst="rect">
-            <a:avLst/>
-          </a:prstGeom>
-        </p:spPr>
-      </p:pic>
-      <p:pic>
-        <p:nvPicPr>
-          <p:cNvPr id="138" name="Picture 137">
-            <a:extLst>
-              <a:ext uri="{FF2B5EF4-FFF2-40B4-BE49-F238E27FC236}">
-                <a16:creationId xmlns:a16="http://schemas.microsoft.com/office/drawing/2014/main" id="{E629F1C3-EFAB-A843-8339-C9295D13D5EA}"/>
-              </a:ext>
-            </a:extLst>
-          </p:cNvPr>
-          <p:cNvPicPr>
-            <a:picLocks noChangeAspect="1"/>
-          </p:cNvPicPr>
-          <p:nvPr/>
-        </p:nvPicPr>
-        <p:blipFill rotWithShape="1">
-          <a:blip r:embed="rId7"/>
           <a:srcRect l="76032" t="20675" r="1294" b="51897"/>
           <a:stretch/>
         </p:blipFill>
@@ -9588,15 +9559,15 @@
           <p:nvPr/>
         </p:nvPicPr>
         <p:blipFill>
-          <a:blip r:embed="rId8"/>
+          <a:blip r:embed="rId7"/>
           <a:stretch>
             <a:fillRect/>
           </a:stretch>
         </p:blipFill>
         <p:spPr>
           <a:xfrm>
-            <a:off x="10362763" y="3904157"/>
-            <a:ext cx="1374997" cy="1348984"/>
+            <a:off x="10337185" y="3861211"/>
+            <a:ext cx="1444349" cy="1417024"/>
           </a:xfrm>
           <a:prstGeom prst="rect">
             <a:avLst/>
@@ -9618,7 +9589,7 @@
           <p:nvPr/>
         </p:nvPicPr>
         <p:blipFill>
-          <a:blip r:embed="rId9"/>
+          <a:blip r:embed="rId8"/>
           <a:stretch>
             <a:fillRect/>
           </a:stretch>
@@ -9635,10 +9606,40 @@
       </p:pic>
       <p:pic>
         <p:nvPicPr>
-          <p:cNvPr id="9" name="Picture 8">
-            <a:extLst>
-              <a:ext uri="{FF2B5EF4-FFF2-40B4-BE49-F238E27FC236}">
-                <a16:creationId xmlns:a16="http://schemas.microsoft.com/office/drawing/2014/main" id="{84E51B76-02E3-CF42-9584-CE7FF505CFDC}"/>
+          <p:cNvPr id="4" name="Picture 3">
+            <a:extLst>
+              <a:ext uri="{FF2B5EF4-FFF2-40B4-BE49-F238E27FC236}">
+                <a16:creationId xmlns:a16="http://schemas.microsoft.com/office/drawing/2014/main" id="{D4235C9F-6673-D14C-9198-BB2F3DC853DD}"/>
+              </a:ext>
+            </a:extLst>
+          </p:cNvPr>
+          <p:cNvPicPr>
+            <a:picLocks noChangeAspect="1"/>
+          </p:cNvPicPr>
+          <p:nvPr/>
+        </p:nvPicPr>
+        <p:blipFill>
+          <a:blip r:embed="rId9"/>
+          <a:stretch>
+            <a:fillRect/>
+          </a:stretch>
+        </p:blipFill>
+        <p:spPr>
+          <a:xfrm>
+            <a:off x="7794459" y="2131313"/>
+            <a:ext cx="1764400" cy="1696827"/>
+          </a:xfrm>
+          <a:prstGeom prst="rect">
+            <a:avLst/>
+          </a:prstGeom>
+        </p:spPr>
+      </p:pic>
+      <p:pic>
+        <p:nvPicPr>
+          <p:cNvPr id="10" name="Picture 9">
+            <a:extLst>
+              <a:ext uri="{FF2B5EF4-FFF2-40B4-BE49-F238E27FC236}">
+                <a16:creationId xmlns:a16="http://schemas.microsoft.com/office/drawing/2014/main" id="{5D7F959F-B425-CF46-B77F-CBFA3F9F5452}"/>
               </a:ext>
             </a:extLst>
           </p:cNvPr>
@@ -9655,8 +9656,8 @@
         </p:blipFill>
         <p:spPr>
           <a:xfrm>
-            <a:off x="8700139" y="4370480"/>
-            <a:ext cx="1410058" cy="1368024"/>
+            <a:off x="8711005" y="4370383"/>
+            <a:ext cx="1376362" cy="1347815"/>
           </a:xfrm>
           <a:prstGeom prst="rect">
             <a:avLst/>
@@ -10138,7 +10139,7 @@
         </p:nvSpPr>
         <p:spPr>
           <a:xfrm>
-            <a:off x="8814489" y="4527244"/>
+            <a:off x="8814489" y="4405395"/>
             <a:ext cx="429768" cy="422901"/>
           </a:xfrm>
           <a:prstGeom prst="ellipse">
@@ -10293,7 +10294,7 @@
         </p:nvSpPr>
         <p:spPr>
           <a:xfrm>
-            <a:off x="9254529" y="4527244"/>
+            <a:off x="9254529" y="4405395"/>
             <a:ext cx="2374368" cy="369332"/>
           </a:xfrm>
           <a:prstGeom prst="rect">
@@ -10420,10 +10421,10 @@
       </p:pic>
       <p:grpSp>
         <p:nvGrpSpPr>
-          <p:cNvPr id="6" name="Group 5">
-            <a:extLst>
-              <a:ext uri="{FF2B5EF4-FFF2-40B4-BE49-F238E27FC236}">
-                <a16:creationId xmlns:a16="http://schemas.microsoft.com/office/drawing/2014/main" id="{11AF9C13-6EEA-0742-9495-41A30FA7B46B}"/>
+          <p:cNvPr id="9" name="Group 8">
+            <a:extLst>
+              <a:ext uri="{FF2B5EF4-FFF2-40B4-BE49-F238E27FC236}">
+                <a16:creationId xmlns:a16="http://schemas.microsoft.com/office/drawing/2014/main" id="{0C4FC605-EE20-1D45-8888-AE119DA04044}"/>
               </a:ext>
             </a:extLst>
           </p:cNvPr>
@@ -10432,18 +10433,18 @@
         </p:nvGrpSpPr>
         <p:grpSpPr>
           <a:xfrm>
-            <a:off x="552889" y="1423987"/>
-            <a:ext cx="4853189" cy="5028612"/>
-            <a:chOff x="552889" y="1423987"/>
-            <a:chExt cx="4853189" cy="5028612"/>
+            <a:off x="563103" y="1550879"/>
+            <a:ext cx="4691805" cy="4889849"/>
+            <a:chOff x="563103" y="1550879"/>
+            <a:chExt cx="4691805" cy="4889849"/>
           </a:xfrm>
         </p:grpSpPr>
         <p:pic>
           <p:nvPicPr>
-            <p:cNvPr id="4" name="Picture 3">
+            <p:cNvPr id="7" name="Picture 6">
               <a:extLst>
                 <a:ext uri="{FF2B5EF4-FFF2-40B4-BE49-F238E27FC236}">
-                  <a16:creationId xmlns:a16="http://schemas.microsoft.com/office/drawing/2014/main" id="{2257E460-6C06-9043-B3D1-E3A5C75B03BD}"/>
+                  <a16:creationId xmlns:a16="http://schemas.microsoft.com/office/drawing/2014/main" id="{CFD3EBEB-FFBF-A84B-BA69-A940A9A3F4A1}"/>
                 </a:ext>
               </a:extLst>
             </p:cNvPr>
@@ -10454,13 +10455,13 @@
           </p:nvPicPr>
           <p:blipFill rotWithShape="1">
             <a:blip r:embed="rId6"/>
-            <a:srcRect t="6056" r="9333"/>
+            <a:srcRect t="6577" r="10361"/>
             <a:stretch/>
           </p:blipFill>
           <p:spPr>
             <a:xfrm>
-              <a:off x="552889" y="1423987"/>
-              <a:ext cx="4853189" cy="5028612"/>
+              <a:off x="563103" y="1550879"/>
+              <a:ext cx="4691805" cy="4889849"/>
             </a:xfrm>
             <a:prstGeom prst="rect">
               <a:avLst/>
@@ -10562,7 +10563,7 @@
         </p:nvSpPr>
         <p:spPr>
           <a:xfrm>
-            <a:off x="4745694" y="4388847"/>
+            <a:off x="4714490" y="4480976"/>
             <a:ext cx="1552028" cy="369332"/>
           </a:xfrm>
           <a:prstGeom prst="rect">

</xml_diff>